<commit_message>
Supervision notes + presentation update
</commit_message>
<xml_diff>
--- a/Notes/Michaelmas_Presentation.pptx
+++ b/Notes/Michaelmas_Presentation.pptx
@@ -110,6 +110,11 @@
       </a:defRPr>
     </a:lvl9pPr>
   </p:defaultTextStyle>
+  <p:extLst>
+    <p:ext uri="{EFAFB233-063F-42B5-8137-9DF3F51BA10A}">
+      <p15:sldGuideLst xmlns:p15="http://schemas.microsoft.com/office/powerpoint/2012/main"/>
+    </p:ext>
+  </p:extLst>
 </p:presentation>
 </file>
 
@@ -260,7 +265,7 @@
           <a:p>
             <a:fld id="{6CF6FA9F-03A1-4667-8095-C29261CE0EDE}" type="datetimeFigureOut">
               <a:rPr lang="en-US" smtClean="0"/>
-              <a:t>2018-10-31</a:t>
+              <a:t>2018-11-01</a:t>
             </a:fld>
             <a:endParaRPr lang="en-US"/>
           </a:p>
@@ -458,7 +463,7 @@
           <a:p>
             <a:fld id="{6CF6FA9F-03A1-4667-8095-C29261CE0EDE}" type="datetimeFigureOut">
               <a:rPr lang="en-US" smtClean="0"/>
-              <a:t>2018-10-31</a:t>
+              <a:t>2018-11-01</a:t>
             </a:fld>
             <a:endParaRPr lang="en-US"/>
           </a:p>
@@ -666,7 +671,7 @@
           <a:p>
             <a:fld id="{6CF6FA9F-03A1-4667-8095-C29261CE0EDE}" type="datetimeFigureOut">
               <a:rPr lang="en-US" smtClean="0"/>
-              <a:t>2018-10-31</a:t>
+              <a:t>2018-11-01</a:t>
             </a:fld>
             <a:endParaRPr lang="en-US"/>
           </a:p>
@@ -864,7 +869,7 @@
           <a:p>
             <a:fld id="{6CF6FA9F-03A1-4667-8095-C29261CE0EDE}" type="datetimeFigureOut">
               <a:rPr lang="en-US" smtClean="0"/>
-              <a:t>2018-10-31</a:t>
+              <a:t>2018-11-01</a:t>
             </a:fld>
             <a:endParaRPr lang="en-US"/>
           </a:p>
@@ -1139,7 +1144,7 @@
           <a:p>
             <a:fld id="{6CF6FA9F-03A1-4667-8095-C29261CE0EDE}" type="datetimeFigureOut">
               <a:rPr lang="en-US" smtClean="0"/>
-              <a:t>2018-10-31</a:t>
+              <a:t>2018-11-01</a:t>
             </a:fld>
             <a:endParaRPr lang="en-US"/>
           </a:p>
@@ -1404,7 +1409,7 @@
           <a:p>
             <a:fld id="{6CF6FA9F-03A1-4667-8095-C29261CE0EDE}" type="datetimeFigureOut">
               <a:rPr lang="en-US" smtClean="0"/>
-              <a:t>2018-10-31</a:t>
+              <a:t>2018-11-01</a:t>
             </a:fld>
             <a:endParaRPr lang="en-US"/>
           </a:p>
@@ -1816,7 +1821,7 @@
           <a:p>
             <a:fld id="{6CF6FA9F-03A1-4667-8095-C29261CE0EDE}" type="datetimeFigureOut">
               <a:rPr lang="en-US" smtClean="0"/>
-              <a:t>2018-10-31</a:t>
+              <a:t>2018-11-01</a:t>
             </a:fld>
             <a:endParaRPr lang="en-US"/>
           </a:p>
@@ -1957,7 +1962,7 @@
           <a:p>
             <a:fld id="{6CF6FA9F-03A1-4667-8095-C29261CE0EDE}" type="datetimeFigureOut">
               <a:rPr lang="en-US" smtClean="0"/>
-              <a:t>2018-10-31</a:t>
+              <a:t>2018-11-01</a:t>
             </a:fld>
             <a:endParaRPr lang="en-US"/>
           </a:p>
@@ -2070,7 +2075,7 @@
           <a:p>
             <a:fld id="{6CF6FA9F-03A1-4667-8095-C29261CE0EDE}" type="datetimeFigureOut">
               <a:rPr lang="en-US" smtClean="0"/>
-              <a:t>2018-10-31</a:t>
+              <a:t>2018-11-01</a:t>
             </a:fld>
             <a:endParaRPr lang="en-US"/>
           </a:p>
@@ -2381,7 +2386,7 @@
           <a:p>
             <a:fld id="{6CF6FA9F-03A1-4667-8095-C29261CE0EDE}" type="datetimeFigureOut">
               <a:rPr lang="en-US" smtClean="0"/>
-              <a:t>2018-10-31</a:t>
+              <a:t>2018-11-01</a:t>
             </a:fld>
             <a:endParaRPr lang="en-US"/>
           </a:p>
@@ -2669,7 +2674,7 @@
           <a:p>
             <a:fld id="{6CF6FA9F-03A1-4667-8095-C29261CE0EDE}" type="datetimeFigureOut">
               <a:rPr lang="en-US" smtClean="0"/>
-              <a:t>2018-10-31</a:t>
+              <a:t>2018-11-01</a:t>
             </a:fld>
             <a:endParaRPr lang="en-US"/>
           </a:p>
@@ -2910,7 +2915,7 @@
           <a:p>
             <a:fld id="{6CF6FA9F-03A1-4667-8095-C29261CE0EDE}" type="datetimeFigureOut">
               <a:rPr lang="en-US" smtClean="0"/>
-              <a:t>2018-10-31</a:t>
+              <a:t>2018-11-01</a:t>
             </a:fld>
             <a:endParaRPr lang="en-US"/>
           </a:p>
@@ -3503,7 +3508,7 @@
           <a:p>
             <a:r>
               <a:rPr lang="en-US" dirty="0"/>
-              <a:t>People are not used to just using their hands – the gestures should be intuitive and easy to get used to</a:t>
+              <a:t>People are not used to just using their hands – the gestures should be intuitive and easy to get used to. The interaction should be efficient</a:t>
             </a:r>
           </a:p>
         </p:txBody>
@@ -3589,7 +3594,7 @@
           <a:p>
             <a:r>
               <a:rPr lang="en-US" dirty="0"/>
-              <a:t>Current ways of editing text annotations without any specific input devices are not very user friendly and are quite prone to errors</a:t>
+              <a:t>Design a way of efficiently editing information without any specific input device with minimal learning.</a:t>
             </a:r>
           </a:p>
         </p:txBody>
@@ -3673,15 +3678,43 @@
           <a:bodyPr/>
           <a:lstStyle/>
           <a:p>
+            <a:pPr marL="514350" indent="-514350">
+              <a:buFont typeface="+mj-lt"/>
+              <a:buAutoNum type="arabicPeriod"/>
+            </a:pPr>
             <a:r>
               <a:rPr lang="en-US" dirty="0"/>
-              <a:t>Develop a more ergonomic and user friendly way to edit text annotations</a:t>
-            </a:r>
-          </a:p>
-          <a:p>
+              <a:t>Develop a flexible text editing component for mixed reality.</a:t>
+            </a:r>
+          </a:p>
+          <a:p>
+            <a:pPr marL="514350" indent="-514350">
+              <a:buFont typeface="+mj-lt"/>
+              <a:buAutoNum type="arabicPeriod"/>
+            </a:pPr>
             <a:r>
               <a:rPr lang="en-US" dirty="0"/>
-              <a:t>Improve user experience by optimizing user interaction feedback</a:t>
+              <a:t>Design efficient interaction techniques for editing text.</a:t>
+            </a:r>
+          </a:p>
+          <a:p>
+            <a:pPr marL="514350" indent="-514350">
+              <a:buFont typeface="+mj-lt"/>
+              <a:buAutoNum type="arabicPeriod"/>
+            </a:pPr>
+            <a:r>
+              <a:rPr lang="en-US" dirty="0"/>
+              <a:t>Perform data-driven optimization of the interaction techniques. </a:t>
+            </a:r>
+          </a:p>
+          <a:p>
+            <a:pPr marL="514350" indent="-514350">
+              <a:buFont typeface="+mj-lt"/>
+              <a:buAutoNum type="arabicPeriod"/>
+            </a:pPr>
+            <a:r>
+              <a:rPr lang="en-US" dirty="0"/>
+              <a:t>Stretch goal: validate the system with users.</a:t>
             </a:r>
           </a:p>
         </p:txBody>
@@ -3872,15 +3905,7 @@
             <a:pPr lvl="1"/>
             <a:r>
               <a:rPr lang="en-US" dirty="0"/>
-              <a:t>Implement </a:t>
-            </a:r>
-            <a:r>
-              <a:rPr lang="en-US" dirty="0" err="1"/>
-              <a:t>bette</a:t>
-            </a:r>
-            <a:r>
-              <a:rPr lang="en-US" dirty="0"/>
-              <a:t> gestures</a:t>
+              <a:t>Implement better gestures</a:t>
             </a:r>
           </a:p>
           <a:p>
@@ -3919,6 +3944,13 @@
             <a:r>
               <a:rPr lang="en-US" dirty="0"/>
               <a:t>Report writing</a:t>
+            </a:r>
+          </a:p>
+          <a:p>
+            <a:pPr lvl="1"/>
+            <a:r>
+              <a:rPr lang="en-US" dirty="0"/>
+              <a:t>Draft report</a:t>
             </a:r>
           </a:p>
         </p:txBody>
@@ -4025,8 +4057,13 @@
             <a:pPr lvl="1"/>
             <a:r>
               <a:rPr lang="en-US" dirty="0"/>
-              <a:t>Manual testing (gestures)</a:t>
-            </a:r>
+              <a:t>Model testing of gesture recognition: confusion matrices, receiver operating characteristic curves, </a:t>
+            </a:r>
+            <a:r>
+              <a:rPr lang="en-US" dirty="0" err="1"/>
+              <a:t>etc</a:t>
+            </a:r>
+            <a:endParaRPr lang="en-US" dirty="0"/>
           </a:p>
           <a:p>
             <a:pPr lvl="1"/>
@@ -4068,7 +4105,7 @@
             <a:pPr lvl="1"/>
             <a:r>
               <a:rPr lang="en-US" dirty="0"/>
-              <a:t>Have other people test the system and give feedback</a:t>
+              <a:t>End-user testing</a:t>
             </a:r>
           </a:p>
         </p:txBody>

</xml_diff>